<commit_message>
Apply theme from a potx file to a pptx
</commit_message>
<xml_diff>
--- a/spec/data/temp.pptx
+++ b/spec/data/temp.pptx
@@ -12403,7 +12403,7 @@
 </file>
 
 <file path=ppt/theme/theme1.xml><?xml version="1.0" encoding="utf-8"?>
-<a:theme xmlns:a="http://schemas.openxmlformats.org/drawingml/2006/main" name="Berlin">
+<a:theme xmlns:a="http://schemas.openxmlformats.org/drawingml/2006/main" name="My Theme">
   <a:themeElements>
     <a:clrScheme name="Berlin">
       <a:dk1>
@@ -12650,7 +12650,7 @@
   <a:extraClrSchemeLst/>
   <a:extLst>
     <a:ext uri="{05A4C25C-085E-4340-85A3-A5531E510DB2}">
-      <thm15:themeFamily xmlns:thm15="http://schemas.microsoft.com/office/thememl/2012/main" name="Berlin" id="{7B5DBA9E-B069-418E-9360-A61BDD0615A4}" vid="{C0CBE056-4EF4-4D92-969E-947779DA7AAA}"/>
+      <thm15:themeFamily xmlns:thm15="http://schemas.microsoft.com/office/thememl/2012/main" name="replacement-theme" id="{770D5191-AE20-B54F-8C2E-690EC9599688}" vid="{1FC7FC36-1AF1-6E42-B1CE-0715D4CE81F6}"/>
     </a:ext>
   </a:extLst>
 </a:theme>

</xml_diff>